<commit_message>
Update projects info on 2023
</commit_message>
<xml_diff>
--- a/2023/Projects/Гречешнюк Даниил/emptyPresentation.pptx
+++ b/2023/Projects/Гречешнюк Даниил/emptyPresentation.pptx
@@ -104,81 +104,7 @@
       </a:defRPr>
     </a:lvl9pPr>
   </p:defaultTextStyle>
-  <p:extLst>
-    <p:ext uri="{EFAFB233-063F-42B5-8137-9DF3F51BA10A}">
-      <p15:sldGuideLst xmlns:p15="http://schemas.microsoft.com/office/powerpoint/2012/main"/>
-    </p:ext>
-  </p:extLst>
 </p:presentation>
-</file>
-
-<file path=ppt/revisionInfo.xml><?xml version="1.0" encoding="utf-8"?>
-<p1510:revInfo xmlns:a="http://schemas.openxmlformats.org/drawingml/2006/main" xmlns:r="http://schemas.openxmlformats.org/officeDocument/2006/relationships" xmlns:p1510="http://schemas.microsoft.com/office/powerpoint/2015/10/main">
-  <p1510:revLst>
-    <p1510:client id="{3BB0FF1C-523E-47A3-B4E5-B91E87BFA32B}" v="16" dt="2023-05-13T15:56:59.027"/>
-  </p1510:revLst>
-</p1510:revInfo>
-</file>
-
-<file path=ppt/changesInfos/changesInfo1.xml><?xml version="1.0" encoding="utf-8"?>
-<pc:chgInfo xmlns:a="http://schemas.openxmlformats.org/drawingml/2006/main" xmlns:r="http://schemas.openxmlformats.org/officeDocument/2006/relationships" xmlns:ac="http://schemas.microsoft.com/office/drawing/2013/main/command" xmlns:pc="http://schemas.microsoft.com/office/powerpoint/2013/main/command">
-  <pc:docChgLst>
-    <pc:chgData name="Гречешнюк Даниил" userId="0c56e3aaf6c1ae59" providerId="Windows Live" clId="Web-{3BB0FF1C-523E-47A3-B4E5-B91E87BFA32B}"/>
-    <pc:docChg chg="modSld">
-      <pc:chgData name="Гречешнюк Даниил" userId="0c56e3aaf6c1ae59" providerId="Windows Live" clId="Web-{3BB0FF1C-523E-47A3-B4E5-B91E87BFA32B}" dt="2023-05-13T15:56:58.527" v="3" actId="20577"/>
-      <pc:docMkLst>
-        <pc:docMk/>
-      </pc:docMkLst>
-      <pc:sldChg chg="modSp">
-        <pc:chgData name="Гречешнюк Даниил" userId="0c56e3aaf6c1ae59" providerId="Windows Live" clId="Web-{3BB0FF1C-523E-47A3-B4E5-B91E87BFA32B}" dt="2023-05-13T15:56:58.527" v="3" actId="20577"/>
-        <pc:sldMkLst>
-          <pc:docMk/>
-          <pc:sldMk cId="1351651579" sldId="256"/>
-        </pc:sldMkLst>
-        <pc:spChg chg="mod">
-          <ac:chgData name="Гречешнюк Даниил" userId="0c56e3aaf6c1ae59" providerId="Windows Live" clId="Web-{3BB0FF1C-523E-47A3-B4E5-B91E87BFA32B}" dt="2023-05-13T15:56:58.527" v="3" actId="20577"/>
-          <ac:spMkLst>
-            <pc:docMk/>
-            <pc:sldMk cId="1351651579" sldId="256"/>
-            <ac:spMk id="3" creationId="{00000000-0000-0000-0000-000000000000}"/>
-          </ac:spMkLst>
-        </pc:spChg>
-      </pc:sldChg>
-    </pc:docChg>
-  </pc:docChgLst>
-  <pc:docChgLst>
-    <pc:chgData clId="Web-{3BB0FF1C-523E-47A3-B4E5-B91E87BFA32B}"/>
-    <pc:docChg chg="modSld">
-      <pc:chgData name="" userId="" providerId="" clId="Web-{3BB0FF1C-523E-47A3-B4E5-B91E87BFA32B}" dt="2023-05-13T15:56:55.980" v="10" actId="20577"/>
-      <pc:docMkLst>
-        <pc:docMk/>
-      </pc:docMkLst>
-      <pc:sldChg chg="modSp">
-        <pc:chgData name="" userId="" providerId="" clId="Web-{3BB0FF1C-523E-47A3-B4E5-B91E87BFA32B}" dt="2023-05-13T15:56:55.980" v="10" actId="20577"/>
-        <pc:sldMkLst>
-          <pc:docMk/>
-          <pc:sldMk cId="1351651579" sldId="256"/>
-        </pc:sldMkLst>
-        <pc:spChg chg="mod">
-          <ac:chgData name="" userId="" providerId="" clId="Web-{3BB0FF1C-523E-47A3-B4E5-B91E87BFA32B}" dt="2023-05-13T15:56:52.105" v="9" actId="20577"/>
-          <ac:spMkLst>
-            <pc:docMk/>
-            <pc:sldMk cId="1351651579" sldId="256"/>
-            <ac:spMk id="2" creationId="{00000000-0000-0000-0000-000000000000}"/>
-          </ac:spMkLst>
-        </pc:spChg>
-        <pc:spChg chg="mod">
-          <ac:chgData name="" userId="" providerId="" clId="Web-{3BB0FF1C-523E-47A3-B4E5-B91E87BFA32B}" dt="2023-05-13T15:56:55.980" v="10" actId="20577"/>
-          <ac:spMkLst>
-            <pc:docMk/>
-            <pc:sldMk cId="1351651579" sldId="256"/>
-            <ac:spMk id="3" creationId="{00000000-0000-0000-0000-000000000000}"/>
-          </ac:spMkLst>
-        </pc:spChg>
-      </pc:sldChg>
-    </pc:docChg>
-  </pc:docChgLst>
-</pc:chgInfo>
 </file>
 
 <file path=ppt/slideLayouts/slideLayout1.xml><?xml version="1.0" encoding="utf-8"?>
@@ -223,9 +149,10 @@
           </a:lstStyle>
           <a:p>
             <a:r>
-              <a:rPr lang="ru-RU"/>
+              <a:rPr lang="ru-RU" smtClean="0"/>
               <a:t>Образец заголовка</a:t>
             </a:r>
+            <a:endParaRPr lang="ru-RU"/>
           </a:p>
         </p:txBody>
       </p:sp>
@@ -287,9 +214,10 @@
           </a:lstStyle>
           <a:p>
             <a:r>
-              <a:rPr lang="ru-RU"/>
+              <a:rPr lang="ru-RU" smtClean="0"/>
               <a:t>Образец подзаголовка</a:t>
             </a:r>
+            <a:endParaRPr lang="ru-RU"/>
           </a:p>
         </p:txBody>
       </p:sp>
@@ -308,9 +236,9 @@
           <a:bodyPr/>
           <a:lstStyle/>
           <a:p>
-            <a:fld id="{F2FFB779-270B-4192-84BA-A697F48306DC}" type="datetimeFigureOut">
-              <a:rPr lang="ru-RU" smtClean="0"/>
-              <a:t>13.05.2023</a:t>
+            <a:fld id="{3728FF01-BB3D-4DF7-991E-820956B8168B}" type="datetimeFigureOut">
+              <a:rPr lang="ru-RU" smtClean="0"/>
+              <a:t>19.05.2023</a:t>
             </a:fld>
             <a:endParaRPr lang="ru-RU"/>
           </a:p>
@@ -350,7 +278,7 @@
           <a:bodyPr/>
           <a:lstStyle/>
           <a:p>
-            <a:fld id="{285DC19C-03DA-4066-9FF7-D0BF1BC6D6F6}" type="slidenum">
+            <a:fld id="{1C0BBDD2-0D87-402A-B9F8-E790541587D3}" type="slidenum">
               <a:rPr lang="ru-RU" smtClean="0"/>
               <a:t>‹#›</a:t>
             </a:fld>
@@ -361,7 +289,7 @@
     </p:spTree>
     <p:extLst>
       <p:ext uri="{BB962C8B-B14F-4D97-AF65-F5344CB8AC3E}">
-        <p14:creationId xmlns:p14="http://schemas.microsoft.com/office/powerpoint/2010/main" val="161079921"/>
+        <p14:creationId xmlns:p14="http://schemas.microsoft.com/office/powerpoint/2010/main" val="1368728977"/>
       </p:ext>
     </p:extLst>
   </p:cSld>
@@ -404,9 +332,10 @@
           <a:lstStyle/>
           <a:p>
             <a:r>
-              <a:rPr lang="ru-RU"/>
+              <a:rPr lang="ru-RU" smtClean="0"/>
               <a:t>Образец заголовка</a:t>
             </a:r>
+            <a:endParaRPr lang="ru-RU"/>
           </a:p>
         </p:txBody>
       </p:sp>
@@ -427,37 +356,38 @@
           <a:p>
             <a:pPr lvl="0"/>
             <a:r>
-              <a:rPr lang="ru-RU"/>
+              <a:rPr lang="ru-RU" smtClean="0"/>
               <a:t>Образец текста</a:t>
             </a:r>
           </a:p>
           <a:p>
             <a:pPr lvl="1"/>
             <a:r>
-              <a:rPr lang="ru-RU"/>
+              <a:rPr lang="ru-RU" smtClean="0"/>
               <a:t>Второй уровень</a:t>
             </a:r>
           </a:p>
           <a:p>
             <a:pPr lvl="2"/>
             <a:r>
-              <a:rPr lang="ru-RU"/>
+              <a:rPr lang="ru-RU" smtClean="0"/>
               <a:t>Третий уровень</a:t>
             </a:r>
           </a:p>
           <a:p>
             <a:pPr lvl="3"/>
             <a:r>
-              <a:rPr lang="ru-RU"/>
+              <a:rPr lang="ru-RU" smtClean="0"/>
               <a:t>Четвертый уровень</a:t>
             </a:r>
           </a:p>
           <a:p>
             <a:pPr lvl="4"/>
             <a:r>
-              <a:rPr lang="ru-RU"/>
+              <a:rPr lang="ru-RU" smtClean="0"/>
               <a:t>Пятый уровень</a:t>
             </a:r>
+            <a:endParaRPr lang="ru-RU"/>
           </a:p>
         </p:txBody>
       </p:sp>
@@ -476,9 +406,9 @@
           <a:bodyPr/>
           <a:lstStyle/>
           <a:p>
-            <a:fld id="{F2FFB779-270B-4192-84BA-A697F48306DC}" type="datetimeFigureOut">
-              <a:rPr lang="ru-RU" smtClean="0"/>
-              <a:t>13.05.2023</a:t>
+            <a:fld id="{3728FF01-BB3D-4DF7-991E-820956B8168B}" type="datetimeFigureOut">
+              <a:rPr lang="ru-RU" smtClean="0"/>
+              <a:t>19.05.2023</a:t>
             </a:fld>
             <a:endParaRPr lang="ru-RU"/>
           </a:p>
@@ -518,7 +448,7 @@
           <a:bodyPr/>
           <a:lstStyle/>
           <a:p>
-            <a:fld id="{285DC19C-03DA-4066-9FF7-D0BF1BC6D6F6}" type="slidenum">
+            <a:fld id="{1C0BBDD2-0D87-402A-B9F8-E790541587D3}" type="slidenum">
               <a:rPr lang="ru-RU" smtClean="0"/>
               <a:t>‹#›</a:t>
             </a:fld>
@@ -529,7 +459,7 @@
     </p:spTree>
     <p:extLst>
       <p:ext uri="{BB962C8B-B14F-4D97-AF65-F5344CB8AC3E}">
-        <p14:creationId xmlns:p14="http://schemas.microsoft.com/office/powerpoint/2010/main" val="2065727480"/>
+        <p14:creationId xmlns:p14="http://schemas.microsoft.com/office/powerpoint/2010/main" val="4128118"/>
       </p:ext>
     </p:extLst>
   </p:cSld>
@@ -577,9 +507,10 @@
           <a:lstStyle/>
           <a:p>
             <a:r>
-              <a:rPr lang="ru-RU"/>
+              <a:rPr lang="ru-RU" smtClean="0"/>
               <a:t>Образец заголовка</a:t>
             </a:r>
+            <a:endParaRPr lang="ru-RU"/>
           </a:p>
         </p:txBody>
       </p:sp>
@@ -605,37 +536,38 @@
           <a:p>
             <a:pPr lvl="0"/>
             <a:r>
-              <a:rPr lang="ru-RU"/>
+              <a:rPr lang="ru-RU" smtClean="0"/>
               <a:t>Образец текста</a:t>
             </a:r>
           </a:p>
           <a:p>
             <a:pPr lvl="1"/>
             <a:r>
-              <a:rPr lang="ru-RU"/>
+              <a:rPr lang="ru-RU" smtClean="0"/>
               <a:t>Второй уровень</a:t>
             </a:r>
           </a:p>
           <a:p>
             <a:pPr lvl="2"/>
             <a:r>
-              <a:rPr lang="ru-RU"/>
+              <a:rPr lang="ru-RU" smtClean="0"/>
               <a:t>Третий уровень</a:t>
             </a:r>
           </a:p>
           <a:p>
             <a:pPr lvl="3"/>
             <a:r>
-              <a:rPr lang="ru-RU"/>
+              <a:rPr lang="ru-RU" smtClean="0"/>
               <a:t>Четвертый уровень</a:t>
             </a:r>
           </a:p>
           <a:p>
             <a:pPr lvl="4"/>
             <a:r>
-              <a:rPr lang="ru-RU"/>
+              <a:rPr lang="ru-RU" smtClean="0"/>
               <a:t>Пятый уровень</a:t>
             </a:r>
+            <a:endParaRPr lang="ru-RU"/>
           </a:p>
         </p:txBody>
       </p:sp>
@@ -654,9 +586,9 @@
           <a:bodyPr/>
           <a:lstStyle/>
           <a:p>
-            <a:fld id="{F2FFB779-270B-4192-84BA-A697F48306DC}" type="datetimeFigureOut">
-              <a:rPr lang="ru-RU" smtClean="0"/>
-              <a:t>13.05.2023</a:t>
+            <a:fld id="{3728FF01-BB3D-4DF7-991E-820956B8168B}" type="datetimeFigureOut">
+              <a:rPr lang="ru-RU" smtClean="0"/>
+              <a:t>19.05.2023</a:t>
             </a:fld>
             <a:endParaRPr lang="ru-RU"/>
           </a:p>
@@ -696,7 +628,7 @@
           <a:bodyPr/>
           <a:lstStyle/>
           <a:p>
-            <a:fld id="{285DC19C-03DA-4066-9FF7-D0BF1BC6D6F6}" type="slidenum">
+            <a:fld id="{1C0BBDD2-0D87-402A-B9F8-E790541587D3}" type="slidenum">
               <a:rPr lang="ru-RU" smtClean="0"/>
               <a:t>‹#›</a:t>
             </a:fld>
@@ -707,7 +639,7 @@
     </p:spTree>
     <p:extLst>
       <p:ext uri="{BB962C8B-B14F-4D97-AF65-F5344CB8AC3E}">
-        <p14:creationId xmlns:p14="http://schemas.microsoft.com/office/powerpoint/2010/main" val="812261758"/>
+        <p14:creationId xmlns:p14="http://schemas.microsoft.com/office/powerpoint/2010/main" val="1842895374"/>
       </p:ext>
     </p:extLst>
   </p:cSld>
@@ -750,9 +682,10 @@
           <a:lstStyle/>
           <a:p>
             <a:r>
-              <a:rPr lang="ru-RU"/>
+              <a:rPr lang="ru-RU" smtClean="0"/>
               <a:t>Образец заголовка</a:t>
             </a:r>
+            <a:endParaRPr lang="ru-RU"/>
           </a:p>
         </p:txBody>
       </p:sp>
@@ -773,37 +706,38 @@
           <a:p>
             <a:pPr lvl="0"/>
             <a:r>
-              <a:rPr lang="ru-RU"/>
+              <a:rPr lang="ru-RU" smtClean="0"/>
               <a:t>Образец текста</a:t>
             </a:r>
           </a:p>
           <a:p>
             <a:pPr lvl="1"/>
             <a:r>
-              <a:rPr lang="ru-RU"/>
+              <a:rPr lang="ru-RU" smtClean="0"/>
               <a:t>Второй уровень</a:t>
             </a:r>
           </a:p>
           <a:p>
             <a:pPr lvl="2"/>
             <a:r>
-              <a:rPr lang="ru-RU"/>
+              <a:rPr lang="ru-RU" smtClean="0"/>
               <a:t>Третий уровень</a:t>
             </a:r>
           </a:p>
           <a:p>
             <a:pPr lvl="3"/>
             <a:r>
-              <a:rPr lang="ru-RU"/>
+              <a:rPr lang="ru-RU" smtClean="0"/>
               <a:t>Четвертый уровень</a:t>
             </a:r>
           </a:p>
           <a:p>
             <a:pPr lvl="4"/>
             <a:r>
-              <a:rPr lang="ru-RU"/>
+              <a:rPr lang="ru-RU" smtClean="0"/>
               <a:t>Пятый уровень</a:t>
             </a:r>
+            <a:endParaRPr lang="ru-RU"/>
           </a:p>
         </p:txBody>
       </p:sp>
@@ -822,9 +756,9 @@
           <a:bodyPr/>
           <a:lstStyle/>
           <a:p>
-            <a:fld id="{F2FFB779-270B-4192-84BA-A697F48306DC}" type="datetimeFigureOut">
-              <a:rPr lang="ru-RU" smtClean="0"/>
-              <a:t>13.05.2023</a:t>
+            <a:fld id="{3728FF01-BB3D-4DF7-991E-820956B8168B}" type="datetimeFigureOut">
+              <a:rPr lang="ru-RU" smtClean="0"/>
+              <a:t>19.05.2023</a:t>
             </a:fld>
             <a:endParaRPr lang="ru-RU"/>
           </a:p>
@@ -864,7 +798,7 @@
           <a:bodyPr/>
           <a:lstStyle/>
           <a:p>
-            <a:fld id="{285DC19C-03DA-4066-9FF7-D0BF1BC6D6F6}" type="slidenum">
+            <a:fld id="{1C0BBDD2-0D87-402A-B9F8-E790541587D3}" type="slidenum">
               <a:rPr lang="ru-RU" smtClean="0"/>
               <a:t>‹#›</a:t>
             </a:fld>
@@ -875,7 +809,7 @@
     </p:spTree>
     <p:extLst>
       <p:ext uri="{BB962C8B-B14F-4D97-AF65-F5344CB8AC3E}">
-        <p14:creationId xmlns:p14="http://schemas.microsoft.com/office/powerpoint/2010/main" val="2703711724"/>
+        <p14:creationId xmlns:p14="http://schemas.microsoft.com/office/powerpoint/2010/main" val="118613797"/>
       </p:ext>
     </p:extLst>
   </p:cSld>
@@ -927,9 +861,10 @@
           </a:lstStyle>
           <a:p>
             <a:r>
-              <a:rPr lang="ru-RU"/>
+              <a:rPr lang="ru-RU" smtClean="0"/>
               <a:t>Образец заголовка</a:t>
             </a:r>
+            <a:endParaRPr lang="ru-RU"/>
           </a:p>
         </p:txBody>
       </p:sp>
@@ -1046,7 +981,7 @@
           <a:p>
             <a:pPr lvl="0"/>
             <a:r>
-              <a:rPr lang="ru-RU"/>
+              <a:rPr lang="ru-RU" smtClean="0"/>
               <a:t>Образец текста</a:t>
             </a:r>
           </a:p>
@@ -1067,9 +1002,9 @@
           <a:bodyPr/>
           <a:lstStyle/>
           <a:p>
-            <a:fld id="{F2FFB779-270B-4192-84BA-A697F48306DC}" type="datetimeFigureOut">
-              <a:rPr lang="ru-RU" smtClean="0"/>
-              <a:t>13.05.2023</a:t>
+            <a:fld id="{3728FF01-BB3D-4DF7-991E-820956B8168B}" type="datetimeFigureOut">
+              <a:rPr lang="ru-RU" smtClean="0"/>
+              <a:t>19.05.2023</a:t>
             </a:fld>
             <a:endParaRPr lang="ru-RU"/>
           </a:p>
@@ -1109,7 +1044,7 @@
           <a:bodyPr/>
           <a:lstStyle/>
           <a:p>
-            <a:fld id="{285DC19C-03DA-4066-9FF7-D0BF1BC6D6F6}" type="slidenum">
+            <a:fld id="{1C0BBDD2-0D87-402A-B9F8-E790541587D3}" type="slidenum">
               <a:rPr lang="ru-RU" smtClean="0"/>
               <a:t>‹#›</a:t>
             </a:fld>
@@ -1120,7 +1055,7 @@
     </p:spTree>
     <p:extLst>
       <p:ext uri="{BB962C8B-B14F-4D97-AF65-F5344CB8AC3E}">
-        <p14:creationId xmlns:p14="http://schemas.microsoft.com/office/powerpoint/2010/main" val="4076369896"/>
+        <p14:creationId xmlns:p14="http://schemas.microsoft.com/office/powerpoint/2010/main" val="3811834146"/>
       </p:ext>
     </p:extLst>
   </p:cSld>
@@ -1163,9 +1098,10 @@
           <a:lstStyle/>
           <a:p>
             <a:r>
-              <a:rPr lang="ru-RU"/>
+              <a:rPr lang="ru-RU" smtClean="0"/>
               <a:t>Образец заголовка</a:t>
             </a:r>
+            <a:endParaRPr lang="ru-RU"/>
           </a:p>
         </p:txBody>
       </p:sp>
@@ -1191,37 +1127,38 @@
           <a:p>
             <a:pPr lvl="0"/>
             <a:r>
-              <a:rPr lang="ru-RU"/>
+              <a:rPr lang="ru-RU" smtClean="0"/>
               <a:t>Образец текста</a:t>
             </a:r>
           </a:p>
           <a:p>
             <a:pPr lvl="1"/>
             <a:r>
-              <a:rPr lang="ru-RU"/>
+              <a:rPr lang="ru-RU" smtClean="0"/>
               <a:t>Второй уровень</a:t>
             </a:r>
           </a:p>
           <a:p>
             <a:pPr lvl="2"/>
             <a:r>
-              <a:rPr lang="ru-RU"/>
+              <a:rPr lang="ru-RU" smtClean="0"/>
               <a:t>Третий уровень</a:t>
             </a:r>
           </a:p>
           <a:p>
             <a:pPr lvl="3"/>
             <a:r>
-              <a:rPr lang="ru-RU"/>
+              <a:rPr lang="ru-RU" smtClean="0"/>
               <a:t>Четвертый уровень</a:t>
             </a:r>
           </a:p>
           <a:p>
             <a:pPr lvl="4"/>
             <a:r>
-              <a:rPr lang="ru-RU"/>
+              <a:rPr lang="ru-RU" smtClean="0"/>
               <a:t>Пятый уровень</a:t>
             </a:r>
+            <a:endParaRPr lang="ru-RU"/>
           </a:p>
         </p:txBody>
       </p:sp>
@@ -1247,37 +1184,38 @@
           <a:p>
             <a:pPr lvl="0"/>
             <a:r>
-              <a:rPr lang="ru-RU"/>
+              <a:rPr lang="ru-RU" smtClean="0"/>
               <a:t>Образец текста</a:t>
             </a:r>
           </a:p>
           <a:p>
             <a:pPr lvl="1"/>
             <a:r>
-              <a:rPr lang="ru-RU"/>
+              <a:rPr lang="ru-RU" smtClean="0"/>
               <a:t>Второй уровень</a:t>
             </a:r>
           </a:p>
           <a:p>
             <a:pPr lvl="2"/>
             <a:r>
-              <a:rPr lang="ru-RU"/>
+              <a:rPr lang="ru-RU" smtClean="0"/>
               <a:t>Третий уровень</a:t>
             </a:r>
           </a:p>
           <a:p>
             <a:pPr lvl="3"/>
             <a:r>
-              <a:rPr lang="ru-RU"/>
+              <a:rPr lang="ru-RU" smtClean="0"/>
               <a:t>Четвертый уровень</a:t>
             </a:r>
           </a:p>
           <a:p>
             <a:pPr lvl="4"/>
             <a:r>
-              <a:rPr lang="ru-RU"/>
+              <a:rPr lang="ru-RU" smtClean="0"/>
               <a:t>Пятый уровень</a:t>
             </a:r>
+            <a:endParaRPr lang="ru-RU"/>
           </a:p>
         </p:txBody>
       </p:sp>
@@ -1296,9 +1234,9 @@
           <a:bodyPr/>
           <a:lstStyle/>
           <a:p>
-            <a:fld id="{F2FFB779-270B-4192-84BA-A697F48306DC}" type="datetimeFigureOut">
-              <a:rPr lang="ru-RU" smtClean="0"/>
-              <a:t>13.05.2023</a:t>
+            <a:fld id="{3728FF01-BB3D-4DF7-991E-820956B8168B}" type="datetimeFigureOut">
+              <a:rPr lang="ru-RU" smtClean="0"/>
+              <a:t>19.05.2023</a:t>
             </a:fld>
             <a:endParaRPr lang="ru-RU"/>
           </a:p>
@@ -1338,7 +1276,7 @@
           <a:bodyPr/>
           <a:lstStyle/>
           <a:p>
-            <a:fld id="{285DC19C-03DA-4066-9FF7-D0BF1BC6D6F6}" type="slidenum">
+            <a:fld id="{1C0BBDD2-0D87-402A-B9F8-E790541587D3}" type="slidenum">
               <a:rPr lang="ru-RU" smtClean="0"/>
               <a:t>‹#›</a:t>
             </a:fld>
@@ -1349,7 +1287,7 @@
     </p:spTree>
     <p:extLst>
       <p:ext uri="{BB962C8B-B14F-4D97-AF65-F5344CB8AC3E}">
-        <p14:creationId xmlns:p14="http://schemas.microsoft.com/office/powerpoint/2010/main" val="2625762208"/>
+        <p14:creationId xmlns:p14="http://schemas.microsoft.com/office/powerpoint/2010/main" val="2315120937"/>
       </p:ext>
     </p:extLst>
   </p:cSld>
@@ -1397,9 +1335,10 @@
           <a:lstStyle/>
           <a:p>
             <a:r>
-              <a:rPr lang="ru-RU"/>
+              <a:rPr lang="ru-RU" smtClean="0"/>
               <a:t>Образец заголовка</a:t>
             </a:r>
+            <a:endParaRPr lang="ru-RU"/>
           </a:p>
         </p:txBody>
       </p:sp>
@@ -1462,7 +1401,7 @@
           <a:p>
             <a:pPr lvl="0"/>
             <a:r>
-              <a:rPr lang="ru-RU"/>
+              <a:rPr lang="ru-RU" smtClean="0"/>
               <a:t>Образец текста</a:t>
             </a:r>
           </a:p>
@@ -1490,37 +1429,38 @@
           <a:p>
             <a:pPr lvl="0"/>
             <a:r>
-              <a:rPr lang="ru-RU"/>
+              <a:rPr lang="ru-RU" smtClean="0"/>
               <a:t>Образец текста</a:t>
             </a:r>
           </a:p>
           <a:p>
             <a:pPr lvl="1"/>
             <a:r>
-              <a:rPr lang="ru-RU"/>
+              <a:rPr lang="ru-RU" smtClean="0"/>
               <a:t>Второй уровень</a:t>
             </a:r>
           </a:p>
           <a:p>
             <a:pPr lvl="2"/>
             <a:r>
-              <a:rPr lang="ru-RU"/>
+              <a:rPr lang="ru-RU" smtClean="0"/>
               <a:t>Третий уровень</a:t>
             </a:r>
           </a:p>
           <a:p>
             <a:pPr lvl="3"/>
             <a:r>
-              <a:rPr lang="ru-RU"/>
+              <a:rPr lang="ru-RU" smtClean="0"/>
               <a:t>Четвертый уровень</a:t>
             </a:r>
           </a:p>
           <a:p>
             <a:pPr lvl="4"/>
             <a:r>
-              <a:rPr lang="ru-RU"/>
+              <a:rPr lang="ru-RU" smtClean="0"/>
               <a:t>Пятый уровень</a:t>
             </a:r>
+            <a:endParaRPr lang="ru-RU"/>
           </a:p>
         </p:txBody>
       </p:sp>
@@ -1583,7 +1523,7 @@
           <a:p>
             <a:pPr lvl="0"/>
             <a:r>
-              <a:rPr lang="ru-RU"/>
+              <a:rPr lang="ru-RU" smtClean="0"/>
               <a:t>Образец текста</a:t>
             </a:r>
           </a:p>
@@ -1611,37 +1551,38 @@
           <a:p>
             <a:pPr lvl="0"/>
             <a:r>
-              <a:rPr lang="ru-RU"/>
+              <a:rPr lang="ru-RU" smtClean="0"/>
               <a:t>Образец текста</a:t>
             </a:r>
           </a:p>
           <a:p>
             <a:pPr lvl="1"/>
             <a:r>
-              <a:rPr lang="ru-RU"/>
+              <a:rPr lang="ru-RU" smtClean="0"/>
               <a:t>Второй уровень</a:t>
             </a:r>
           </a:p>
           <a:p>
             <a:pPr lvl="2"/>
             <a:r>
-              <a:rPr lang="ru-RU"/>
+              <a:rPr lang="ru-RU" smtClean="0"/>
               <a:t>Третий уровень</a:t>
             </a:r>
           </a:p>
           <a:p>
             <a:pPr lvl="3"/>
             <a:r>
-              <a:rPr lang="ru-RU"/>
+              <a:rPr lang="ru-RU" smtClean="0"/>
               <a:t>Четвертый уровень</a:t>
             </a:r>
           </a:p>
           <a:p>
             <a:pPr lvl="4"/>
             <a:r>
-              <a:rPr lang="ru-RU"/>
+              <a:rPr lang="ru-RU" smtClean="0"/>
               <a:t>Пятый уровень</a:t>
             </a:r>
+            <a:endParaRPr lang="ru-RU"/>
           </a:p>
         </p:txBody>
       </p:sp>
@@ -1660,9 +1601,9 @@
           <a:bodyPr/>
           <a:lstStyle/>
           <a:p>
-            <a:fld id="{F2FFB779-270B-4192-84BA-A697F48306DC}" type="datetimeFigureOut">
-              <a:rPr lang="ru-RU" smtClean="0"/>
-              <a:t>13.05.2023</a:t>
+            <a:fld id="{3728FF01-BB3D-4DF7-991E-820956B8168B}" type="datetimeFigureOut">
+              <a:rPr lang="ru-RU" smtClean="0"/>
+              <a:t>19.05.2023</a:t>
             </a:fld>
             <a:endParaRPr lang="ru-RU"/>
           </a:p>
@@ -1702,7 +1643,7 @@
           <a:bodyPr/>
           <a:lstStyle/>
           <a:p>
-            <a:fld id="{285DC19C-03DA-4066-9FF7-D0BF1BC6D6F6}" type="slidenum">
+            <a:fld id="{1C0BBDD2-0D87-402A-B9F8-E790541587D3}" type="slidenum">
               <a:rPr lang="ru-RU" smtClean="0"/>
               <a:t>‹#›</a:t>
             </a:fld>
@@ -1713,7 +1654,7 @@
     </p:spTree>
     <p:extLst>
       <p:ext uri="{BB962C8B-B14F-4D97-AF65-F5344CB8AC3E}">
-        <p14:creationId xmlns:p14="http://schemas.microsoft.com/office/powerpoint/2010/main" val="188002762"/>
+        <p14:creationId xmlns:p14="http://schemas.microsoft.com/office/powerpoint/2010/main" val="2282355880"/>
       </p:ext>
     </p:extLst>
   </p:cSld>
@@ -1756,9 +1697,10 @@
           <a:lstStyle/>
           <a:p>
             <a:r>
-              <a:rPr lang="ru-RU"/>
+              <a:rPr lang="ru-RU" smtClean="0"/>
               <a:t>Образец заголовка</a:t>
             </a:r>
+            <a:endParaRPr lang="ru-RU"/>
           </a:p>
         </p:txBody>
       </p:sp>
@@ -1777,9 +1719,9 @@
           <a:bodyPr/>
           <a:lstStyle/>
           <a:p>
-            <a:fld id="{F2FFB779-270B-4192-84BA-A697F48306DC}" type="datetimeFigureOut">
-              <a:rPr lang="ru-RU" smtClean="0"/>
-              <a:t>13.05.2023</a:t>
+            <a:fld id="{3728FF01-BB3D-4DF7-991E-820956B8168B}" type="datetimeFigureOut">
+              <a:rPr lang="ru-RU" smtClean="0"/>
+              <a:t>19.05.2023</a:t>
             </a:fld>
             <a:endParaRPr lang="ru-RU"/>
           </a:p>
@@ -1819,7 +1761,7 @@
           <a:bodyPr/>
           <a:lstStyle/>
           <a:p>
-            <a:fld id="{285DC19C-03DA-4066-9FF7-D0BF1BC6D6F6}" type="slidenum">
+            <a:fld id="{1C0BBDD2-0D87-402A-B9F8-E790541587D3}" type="slidenum">
               <a:rPr lang="ru-RU" smtClean="0"/>
               <a:t>‹#›</a:t>
             </a:fld>
@@ -1830,7 +1772,7 @@
     </p:spTree>
     <p:extLst>
       <p:ext uri="{BB962C8B-B14F-4D97-AF65-F5344CB8AC3E}">
-        <p14:creationId xmlns:p14="http://schemas.microsoft.com/office/powerpoint/2010/main" val="2295335545"/>
+        <p14:creationId xmlns:p14="http://schemas.microsoft.com/office/powerpoint/2010/main" val="1641012704"/>
       </p:ext>
     </p:extLst>
   </p:cSld>
@@ -1872,9 +1814,9 @@
           <a:bodyPr/>
           <a:lstStyle/>
           <a:p>
-            <a:fld id="{F2FFB779-270B-4192-84BA-A697F48306DC}" type="datetimeFigureOut">
-              <a:rPr lang="ru-RU" smtClean="0"/>
-              <a:t>13.05.2023</a:t>
+            <a:fld id="{3728FF01-BB3D-4DF7-991E-820956B8168B}" type="datetimeFigureOut">
+              <a:rPr lang="ru-RU" smtClean="0"/>
+              <a:t>19.05.2023</a:t>
             </a:fld>
             <a:endParaRPr lang="ru-RU"/>
           </a:p>
@@ -1914,7 +1856,7 @@
           <a:bodyPr/>
           <a:lstStyle/>
           <a:p>
-            <a:fld id="{285DC19C-03DA-4066-9FF7-D0BF1BC6D6F6}" type="slidenum">
+            <a:fld id="{1C0BBDD2-0D87-402A-B9F8-E790541587D3}" type="slidenum">
               <a:rPr lang="ru-RU" smtClean="0"/>
               <a:t>‹#›</a:t>
             </a:fld>
@@ -1925,7 +1867,7 @@
     </p:spTree>
     <p:extLst>
       <p:ext uri="{BB962C8B-B14F-4D97-AF65-F5344CB8AC3E}">
-        <p14:creationId xmlns:p14="http://schemas.microsoft.com/office/powerpoint/2010/main" val="1988754143"/>
+        <p14:creationId xmlns:p14="http://schemas.microsoft.com/office/powerpoint/2010/main" val="3558955625"/>
       </p:ext>
     </p:extLst>
   </p:cSld>
@@ -1977,9 +1919,10 @@
           </a:lstStyle>
           <a:p>
             <a:r>
-              <a:rPr lang="ru-RU"/>
+              <a:rPr lang="ru-RU" smtClean="0"/>
               <a:t>Образец заголовка</a:t>
             </a:r>
+            <a:endParaRPr lang="ru-RU"/>
           </a:p>
         </p:txBody>
       </p:sp>
@@ -2033,37 +1976,38 @@
           <a:p>
             <a:pPr lvl="0"/>
             <a:r>
-              <a:rPr lang="ru-RU"/>
+              <a:rPr lang="ru-RU" smtClean="0"/>
               <a:t>Образец текста</a:t>
             </a:r>
           </a:p>
           <a:p>
             <a:pPr lvl="1"/>
             <a:r>
-              <a:rPr lang="ru-RU"/>
+              <a:rPr lang="ru-RU" smtClean="0"/>
               <a:t>Второй уровень</a:t>
             </a:r>
           </a:p>
           <a:p>
             <a:pPr lvl="2"/>
             <a:r>
-              <a:rPr lang="ru-RU"/>
+              <a:rPr lang="ru-RU" smtClean="0"/>
               <a:t>Третий уровень</a:t>
             </a:r>
           </a:p>
           <a:p>
             <a:pPr lvl="3"/>
             <a:r>
-              <a:rPr lang="ru-RU"/>
+              <a:rPr lang="ru-RU" smtClean="0"/>
               <a:t>Четвертый уровень</a:t>
             </a:r>
           </a:p>
           <a:p>
             <a:pPr lvl="4"/>
             <a:r>
-              <a:rPr lang="ru-RU"/>
+              <a:rPr lang="ru-RU" smtClean="0"/>
               <a:t>Пятый уровень</a:t>
             </a:r>
+            <a:endParaRPr lang="ru-RU"/>
           </a:p>
         </p:txBody>
       </p:sp>
@@ -2126,7 +2070,7 @@
           <a:p>
             <a:pPr lvl="0"/>
             <a:r>
-              <a:rPr lang="ru-RU"/>
+              <a:rPr lang="ru-RU" smtClean="0"/>
               <a:t>Образец текста</a:t>
             </a:r>
           </a:p>
@@ -2147,9 +2091,9 @@
           <a:bodyPr/>
           <a:lstStyle/>
           <a:p>
-            <a:fld id="{F2FFB779-270B-4192-84BA-A697F48306DC}" type="datetimeFigureOut">
-              <a:rPr lang="ru-RU" smtClean="0"/>
-              <a:t>13.05.2023</a:t>
+            <a:fld id="{3728FF01-BB3D-4DF7-991E-820956B8168B}" type="datetimeFigureOut">
+              <a:rPr lang="ru-RU" smtClean="0"/>
+              <a:t>19.05.2023</a:t>
             </a:fld>
             <a:endParaRPr lang="ru-RU"/>
           </a:p>
@@ -2189,7 +2133,7 @@
           <a:bodyPr/>
           <a:lstStyle/>
           <a:p>
-            <a:fld id="{285DC19C-03DA-4066-9FF7-D0BF1BC6D6F6}" type="slidenum">
+            <a:fld id="{1C0BBDD2-0D87-402A-B9F8-E790541587D3}" type="slidenum">
               <a:rPr lang="ru-RU" smtClean="0"/>
               <a:t>‹#›</a:t>
             </a:fld>
@@ -2200,7 +2144,7 @@
     </p:spTree>
     <p:extLst>
       <p:ext uri="{BB962C8B-B14F-4D97-AF65-F5344CB8AC3E}">
-        <p14:creationId xmlns:p14="http://schemas.microsoft.com/office/powerpoint/2010/main" val="3665695281"/>
+        <p14:creationId xmlns:p14="http://schemas.microsoft.com/office/powerpoint/2010/main" val="3045552266"/>
       </p:ext>
     </p:extLst>
   </p:cSld>
@@ -2252,9 +2196,10 @@
           </a:lstStyle>
           <a:p>
             <a:r>
-              <a:rPr lang="ru-RU"/>
+              <a:rPr lang="ru-RU" smtClean="0"/>
               <a:t>Образец заголовка</a:t>
             </a:r>
+            <a:endParaRPr lang="ru-RU"/>
           </a:p>
         </p:txBody>
       </p:sp>
@@ -2378,7 +2323,7 @@
           <a:p>
             <a:pPr lvl="0"/>
             <a:r>
-              <a:rPr lang="ru-RU"/>
+              <a:rPr lang="ru-RU" smtClean="0"/>
               <a:t>Образец текста</a:t>
             </a:r>
           </a:p>
@@ -2399,9 +2344,9 @@
           <a:bodyPr/>
           <a:lstStyle/>
           <a:p>
-            <a:fld id="{F2FFB779-270B-4192-84BA-A697F48306DC}" type="datetimeFigureOut">
-              <a:rPr lang="ru-RU" smtClean="0"/>
-              <a:t>13.05.2023</a:t>
+            <a:fld id="{3728FF01-BB3D-4DF7-991E-820956B8168B}" type="datetimeFigureOut">
+              <a:rPr lang="ru-RU" smtClean="0"/>
+              <a:t>19.05.2023</a:t>
             </a:fld>
             <a:endParaRPr lang="ru-RU"/>
           </a:p>
@@ -2441,7 +2386,7 @@
           <a:bodyPr/>
           <a:lstStyle/>
           <a:p>
-            <a:fld id="{285DC19C-03DA-4066-9FF7-D0BF1BC6D6F6}" type="slidenum">
+            <a:fld id="{1C0BBDD2-0D87-402A-B9F8-E790541587D3}" type="slidenum">
               <a:rPr lang="ru-RU" smtClean="0"/>
               <a:t>‹#›</a:t>
             </a:fld>
@@ -2452,7 +2397,7 @@
     </p:spTree>
     <p:extLst>
       <p:ext uri="{BB962C8B-B14F-4D97-AF65-F5344CB8AC3E}">
-        <p14:creationId xmlns:p14="http://schemas.microsoft.com/office/powerpoint/2010/main" val="2134169247"/>
+        <p14:creationId xmlns:p14="http://schemas.microsoft.com/office/powerpoint/2010/main" val="2100981981"/>
       </p:ext>
     </p:extLst>
   </p:cSld>
@@ -2510,9 +2455,10 @@
           <a:lstStyle/>
           <a:p>
             <a:r>
-              <a:rPr lang="ru-RU"/>
+              <a:rPr lang="ru-RU" smtClean="0"/>
               <a:t>Образец заголовка</a:t>
             </a:r>
+            <a:endParaRPr lang="ru-RU"/>
           </a:p>
         </p:txBody>
       </p:sp>
@@ -2543,37 +2489,38 @@
           <a:p>
             <a:pPr lvl="0"/>
             <a:r>
-              <a:rPr lang="ru-RU"/>
+              <a:rPr lang="ru-RU" smtClean="0"/>
               <a:t>Образец текста</a:t>
             </a:r>
           </a:p>
           <a:p>
             <a:pPr lvl="1"/>
             <a:r>
-              <a:rPr lang="ru-RU"/>
+              <a:rPr lang="ru-RU" smtClean="0"/>
               <a:t>Второй уровень</a:t>
             </a:r>
           </a:p>
           <a:p>
             <a:pPr lvl="2"/>
             <a:r>
-              <a:rPr lang="ru-RU"/>
+              <a:rPr lang="ru-RU" smtClean="0"/>
               <a:t>Третий уровень</a:t>
             </a:r>
           </a:p>
           <a:p>
             <a:pPr lvl="3"/>
             <a:r>
-              <a:rPr lang="ru-RU"/>
+              <a:rPr lang="ru-RU" smtClean="0"/>
               <a:t>Четвертый уровень</a:t>
             </a:r>
           </a:p>
           <a:p>
             <a:pPr lvl="4"/>
             <a:r>
-              <a:rPr lang="ru-RU"/>
+              <a:rPr lang="ru-RU" smtClean="0"/>
               <a:t>Пятый уровень</a:t>
             </a:r>
+            <a:endParaRPr lang="ru-RU"/>
           </a:p>
         </p:txBody>
       </p:sp>
@@ -2610,9 +2557,9 @@
             </a:lvl1pPr>
           </a:lstStyle>
           <a:p>
-            <a:fld id="{F2FFB779-270B-4192-84BA-A697F48306DC}" type="datetimeFigureOut">
-              <a:rPr lang="ru-RU" smtClean="0"/>
-              <a:t>13.05.2023</a:t>
+            <a:fld id="{3728FF01-BB3D-4DF7-991E-820956B8168B}" type="datetimeFigureOut">
+              <a:rPr lang="ru-RU" smtClean="0"/>
+              <a:t>19.05.2023</a:t>
             </a:fld>
             <a:endParaRPr lang="ru-RU"/>
           </a:p>
@@ -2688,7 +2635,7 @@
             </a:lvl1pPr>
           </a:lstStyle>
           <a:p>
-            <a:fld id="{285DC19C-03DA-4066-9FF7-D0BF1BC6D6F6}" type="slidenum">
+            <a:fld id="{1C0BBDD2-0D87-402A-B9F8-E790541587D3}" type="slidenum">
               <a:rPr lang="ru-RU" smtClean="0"/>
               <a:t>‹#›</a:t>
             </a:fld>
@@ -2699,7 +2646,7 @@
     </p:spTree>
     <p:extLst>
       <p:ext uri="{BB962C8B-B14F-4D97-AF65-F5344CB8AC3E}">
-        <p14:creationId xmlns:p14="http://schemas.microsoft.com/office/powerpoint/2010/main" val="3154979492"/>
+        <p14:creationId xmlns:p14="http://schemas.microsoft.com/office/powerpoint/2010/main" val="984098243"/>
       </p:ext>
     </p:extLst>
   </p:cSld>
@@ -3033,36 +2980,10 @@
           <a:lstStyle/>
           <a:p>
             <a:r>
-              <a:rPr lang="ru-RU" dirty="0" err="1">
-                <a:cs typeface="Calibri Light"/>
-              </a:rPr>
-              <a:t>Temp</a:t>
-            </a:r>
-            <a:r>
-              <a:rPr lang="ru-RU" dirty="0">
-                <a:cs typeface="Calibri Light"/>
-              </a:rPr>
-              <a:t> </a:t>
-            </a:r>
-            <a:r>
-              <a:rPr lang="ru-RU" dirty="0" err="1">
-                <a:cs typeface="Calibri Light"/>
-              </a:rPr>
-              <a:t>empty</a:t>
-            </a:r>
-            <a:r>
-              <a:rPr lang="ru-RU" dirty="0">
-                <a:cs typeface="Calibri Light"/>
-              </a:rPr>
-              <a:t> </a:t>
-            </a:r>
-            <a:r>
-              <a:rPr lang="ru-RU" dirty="0" err="1">
-                <a:cs typeface="Calibri Light"/>
-              </a:rPr>
-              <a:t>presentation</a:t>
-            </a:r>
-            <a:endParaRPr lang="ru-RU" dirty="0" err="1"/>
+              <a:rPr lang="ru-RU" smtClean="0"/>
+              <a:t>да</a:t>
+            </a:r>
+            <a:endParaRPr lang="ru-RU"/>
           </a:p>
         </p:txBody>
       </p:sp>
@@ -3078,17 +2999,9 @@
         </p:nvSpPr>
         <p:spPr/>
         <p:txBody>
-          <a:bodyPr vert="horz" lIns="91440" tIns="45720" rIns="91440" bIns="45720" rtlCol="0" anchor="t">
-            <a:normAutofit/>
-          </a:bodyPr>
-          <a:lstStyle/>
-          <a:p>
-            <a:r>
-              <a:rPr lang="ru-RU">
-                <a:cs typeface="Calibri"/>
-              </a:rPr>
-              <a:t>формальность</a:t>
-            </a:r>
+          <a:bodyPr/>
+          <a:lstStyle/>
+          <a:p>
             <a:endParaRPr lang="ru-RU"/>
           </a:p>
         </p:txBody>
@@ -3096,7 +3009,7 @@
     </p:spTree>
     <p:extLst>
       <p:ext uri="{BB962C8B-B14F-4D97-AF65-F5344CB8AC3E}">
-        <p14:creationId xmlns:p14="http://schemas.microsoft.com/office/powerpoint/2010/main" val="1351651579"/>
+        <p14:creationId xmlns:p14="http://schemas.microsoft.com/office/powerpoint/2010/main" val="3284471107"/>
       </p:ext>
     </p:extLst>
   </p:cSld>
@@ -3123,7 +3036,7 @@
         <a:srgbClr val="E7E6E6"/>
       </a:lt2>
       <a:accent1>
-        <a:srgbClr val="4472C4"/>
+        <a:srgbClr val="5B9BD5"/>
       </a:accent1>
       <a:accent2>
         <a:srgbClr val="ED7D31"/>
@@ -3135,7 +3048,7 @@
         <a:srgbClr val="FFC000"/>
       </a:accent4>
       <a:accent5>
-        <a:srgbClr val="5B9BD5"/>
+        <a:srgbClr val="4472C4"/>
       </a:accent5>
       <a:accent6>
         <a:srgbClr val="70AD47"/>
@@ -3152,9 +3065,9 @@
         <a:latin typeface="Calibri Light" panose="020F0302020204030204"/>
         <a:ea typeface=""/>
         <a:cs typeface=""/>
-        <a:font script="Jpan" typeface="ＭＳ Ｐゴシック"/>
+        <a:font script="Jpan" typeface="游ゴシック Light"/>
         <a:font script="Hang" typeface="맑은 고딕"/>
-        <a:font script="Hans" typeface="宋体"/>
+        <a:font script="Hans" typeface="等线 Light"/>
         <a:font script="Hant" typeface="新細明體"/>
         <a:font script="Arab" typeface="Times New Roman"/>
         <a:font script="Hebr" typeface="Times New Roman"/>
@@ -3187,9 +3100,9 @@
         <a:latin typeface="Calibri" panose="020F0502020204030204"/>
         <a:ea typeface=""/>
         <a:cs typeface=""/>
-        <a:font script="Jpan" typeface="ＭＳ Ｐゴシック"/>
+        <a:font script="Jpan" typeface="游ゴシック"/>
         <a:font script="Hang" typeface="맑은 고딕"/>
-        <a:font script="Hans" typeface="宋体"/>
+        <a:font script="Hans" typeface="等线"/>
         <a:font script="Hant" typeface="新細明體"/>
         <a:font script="Arab" typeface="Arial"/>
         <a:font script="Hebr" typeface="Arial"/>

</xml_diff>